<commit_message>
Fixes to B04 Agile Planning
</commit_message>
<xml_diff>
--- a/Lecture slides/AMOS B04 - Agile Planning.pptx
+++ b/Lecture slides/AMOS B04 - Agile Planning.pptx
@@ -10577,7 +10577,7 @@
             <a:tbl>
               <a:tblPr>
                 <a:noFill/>
-                <a:tableStyleId>{87D43221-98BD-41B1-B8BD-493E43BA7D8A}</a:tableStyleId>
+                <a:tableStyleId>{0C347D07-D8C3-4DD9-AC4C-8819EA2C0EF1}</a:tableStyleId>
               </a:tblPr>
               <a:tblGrid>
                 <a:gridCol w="2466575"/>
@@ -11580,7 +11580,7 @@
             </a:pPr>
             <a:r>
               <a:rPr lang="en"/>
-              <a:t>Make terms mutually exclusive, completely exhaustive</a:t>
+              <a:t>Make terms mutually exclusive, completely exhaustive (MECE)</a:t>
             </a:r>
             <a:endParaRPr/>
           </a:p>
@@ -12762,7 +12762,7 @@
         <p:spPr>
           <a:xfrm>
             <a:off x="274320" y="914400"/>
-            <a:ext cx="8595360" cy="3495446"/>
+            <a:ext cx="8595360" cy="3501478"/>
           </a:xfrm>
           <a:prstGeom prst="rect">
             <a:avLst/>
@@ -12922,7 +12922,7 @@
             </a:r>
             <a:r>
               <a:rPr b="1" lang="en"/>
-              <a:t>bug fix </a:t>
+              <a:t>bug fix request </a:t>
             </a:r>
             <a:r>
               <a:rPr lang="en"/>
@@ -13187,6 +13187,22 @@
             </a:pPr>
             <a:r>
               <a:rPr lang="en"/>
+              <a:t>Product owners, please don’t forget to take turns</a:t>
+            </a:r>
+            <a:endParaRPr/>
+          </a:p>
+          <a:p>
+            <a:pPr indent="0" lvl="0" marL="0" rtl="0" algn="l">
+              <a:spcBef>
+                <a:spcPts val="1200"/>
+              </a:spcBef>
+              <a:spcAft>
+                <a:spcPts val="0"/>
+              </a:spcAft>
+              <a:buNone/>
+            </a:pPr>
+            <a:r>
+              <a:rPr lang="en"/>
               <a:t>Please sign-off your commits and declare your co-authors, if any</a:t>
             </a:r>
             <a:endParaRPr/>
@@ -13219,7 +13235,7 @@
             </a:pPr>
             <a:r>
               <a:rPr lang="en"/>
-              <a:t>Don’t forget your sprint preparation meeting</a:t>
+              <a:t>Don’t forget your next sprint preparation meeting</a:t>
             </a:r>
             <a:endParaRPr/>
           </a:p>
@@ -14250,7 +14266,7 @@
             <a:tbl>
               <a:tblPr>
                 <a:noFill/>
-                <a:tableStyleId>{87D43221-98BD-41B1-B8BD-493E43BA7D8A}</a:tableStyleId>
+                <a:tableStyleId>{0C347D07-D8C3-4DD9-AC4C-8819EA2C0EF1}</a:tableStyleId>
               </a:tblPr>
               <a:tblGrid>
                 <a:gridCol w="647000"/>
@@ -15657,7 +15673,7 @@
             <a:tbl>
               <a:tblPr>
                 <a:noFill/>
-                <a:tableStyleId>{87D43221-98BD-41B1-B8BD-493E43BA7D8A}</a:tableStyleId>
+                <a:tableStyleId>{0C347D07-D8C3-4DD9-AC4C-8819EA2C0EF1}</a:tableStyleId>
               </a:tblPr>
               <a:tblGrid>
                 <a:gridCol w="2057400"/>
@@ -17250,7 +17266,7 @@
             <a:tbl>
               <a:tblPr>
                 <a:noFill/>
-                <a:tableStyleId>{87D43221-98BD-41B1-B8BD-493E43BA7D8A}</a:tableStyleId>
+                <a:tableStyleId>{0C347D07-D8C3-4DD9-AC4C-8819EA2C0EF1}</a:tableStyleId>
               </a:tblPr>
               <a:tblGrid>
                 <a:gridCol w="637250"/>
@@ -18281,7 +18297,7 @@
             </a:pPr>
             <a:r>
               <a:rPr lang="en"/>
-              <a:t>Prioritization by Risk / Reward</a:t>
+              <a:t>Prioritization by Risk / Value</a:t>
             </a:r>
             <a:endParaRPr/>
           </a:p>
@@ -21247,7 +21263,7 @@
             <a:tbl>
               <a:tblPr>
                 <a:noFill/>
-                <a:tableStyleId>{3EBA1027-9DA7-4C02-BA84-A18D9EF3BC8C}</a:tableStyleId>
+                <a:tableStyleId>{62382484-7E76-43DB-B48F-D7B24B333410}</a:tableStyleId>
               </a:tblPr>
               <a:tblGrid>
                 <a:gridCol w="645525"/>
@@ -34020,7 +34036,7 @@
             </a:pPr>
             <a:r>
               <a:rPr lang="en"/>
-              <a:t>Please create and agree upon definitions of done for all three types</a:t>
+              <a:t>Please discuss and agree upon definitions of done for all three types</a:t>
             </a:r>
             <a:endParaRPr/>
           </a:p>
@@ -34475,7 +34491,7 @@
             <a:tbl>
               <a:tblPr>
                 <a:noFill/>
-                <a:tableStyleId>{87D43221-98BD-41B1-B8BD-493E43BA7D8A}</a:tableStyleId>
+                <a:tableStyleId>{0C347D07-D8C3-4DD9-AC4C-8819EA2C0EF1}</a:tableStyleId>
               </a:tblPr>
               <a:tblGrid>
                 <a:gridCol w="1719075"/>
@@ -34559,14 +34575,14 @@
                         <a:buNone/>
                       </a:pPr>
                       <a:r>
-                        <a:rPr b="1" lang="en" sz="1800">
+                        <a:rPr b="1" lang="en">
                           <a:solidFill>
                             <a:schemeClr val="lt1"/>
                           </a:solidFill>
                         </a:rPr>
                         <a:t>Time-frame</a:t>
                       </a:r>
-                      <a:endParaRPr b="1" sz="1800">
+                      <a:endParaRPr b="1">
                         <a:solidFill>
                           <a:schemeClr val="lt1"/>
                         </a:solidFill>
@@ -34630,14 +34646,14 @@
                         <a:buNone/>
                       </a:pPr>
                       <a:r>
-                        <a:rPr b="1" lang="en" sz="1800">
+                        <a:rPr b="1" lang="en">
                           <a:solidFill>
                             <a:schemeClr val="lt1"/>
                           </a:solidFill>
                         </a:rPr>
                         <a:t>Content</a:t>
                       </a:r>
-                      <a:endParaRPr b="1" sz="1800">
+                      <a:endParaRPr b="1">
                         <a:solidFill>
                           <a:schemeClr val="lt1"/>
                         </a:solidFill>
@@ -34701,14 +34717,14 @@
                         <a:buNone/>
                       </a:pPr>
                       <a:r>
-                        <a:rPr b="1" lang="en" sz="1800">
+                        <a:rPr b="1" lang="en">
                           <a:solidFill>
                             <a:schemeClr val="lt1"/>
                           </a:solidFill>
                         </a:rPr>
                         <a:t>Certainty</a:t>
                       </a:r>
-                      <a:endParaRPr b="1" sz="1800">
+                      <a:endParaRPr b="1">
                         <a:solidFill>
                           <a:schemeClr val="lt1"/>
                         </a:solidFill>
@@ -34772,14 +34788,14 @@
                         <a:buNone/>
                       </a:pPr>
                       <a:r>
-                        <a:rPr b="1" lang="en" sz="1800">
+                        <a:rPr b="1" lang="en">
                           <a:solidFill>
                             <a:schemeClr val="lt1"/>
                           </a:solidFill>
                         </a:rPr>
                         <a:t>Owner</a:t>
                       </a:r>
-                      <a:endParaRPr b="1" sz="1800">
+                      <a:endParaRPr b="1">
                         <a:solidFill>
                           <a:schemeClr val="lt1"/>
                         </a:solidFill>
@@ -34835,7 +34851,7 @@
                     <a:bodyPr/>
                     <a:lstStyle/>
                     <a:p>
-                      <a:pPr indent="0" lvl="0" marL="0" rtl="0" algn="l">
+                      <a:pPr indent="0" lvl="0" marL="0" rtl="0" algn="ctr">
                         <a:spcBef>
                           <a:spcPts val="0"/>
                         </a:spcBef>
@@ -34845,7 +34861,7 @@
                         <a:buNone/>
                       </a:pPr>
                       <a:r>
-                        <a:rPr b="1" lang="en" sz="1800">
+                        <a:rPr b="1" lang="en">
                           <a:solidFill>
                             <a:schemeClr val="lt1"/>
                           </a:solidFill>
@@ -34853,21 +34869,21 @@
                         <a:t>Product</a:t>
                       </a:r>
                       <a:br>
-                        <a:rPr b="1" lang="en" sz="1800">
+                        <a:rPr b="1" lang="en">
                           <a:solidFill>
                             <a:schemeClr val="lt1"/>
                           </a:solidFill>
                         </a:rPr>
                       </a:br>
                       <a:r>
-                        <a:rPr b="1" lang="en" sz="1800">
+                        <a:rPr b="1" lang="en">
                           <a:solidFill>
                             <a:schemeClr val="lt1"/>
                           </a:solidFill>
                         </a:rPr>
                         <a:t>vision</a:t>
                       </a:r>
-                      <a:endParaRPr b="1" sz="1800">
+                      <a:endParaRPr b="1">
                         <a:solidFill>
                           <a:schemeClr val="lt1"/>
                         </a:solidFill>
@@ -35174,7 +35190,7 @@
                     <a:bodyPr/>
                     <a:lstStyle/>
                     <a:p>
-                      <a:pPr indent="0" lvl="0" marL="0" rtl="0" algn="l">
+                      <a:pPr indent="0" lvl="0" marL="0" rtl="0" algn="ctr">
                         <a:spcBef>
                           <a:spcPts val="0"/>
                         </a:spcBef>
@@ -35184,14 +35200,38 @@
                         <a:buNone/>
                       </a:pPr>
                       <a:r>
-                        <a:rPr b="1" lang="en" sz="1800">
+                        <a:rPr b="1" lang="en">
                           <a:solidFill>
                             <a:schemeClr val="lt1"/>
                           </a:solidFill>
                         </a:rPr>
-                        <a:t>Product roadmap</a:t>
+                        <a:t>Product</a:t>
                       </a:r>
-                      <a:endParaRPr b="1" sz="1800">
+                      <a:endParaRPr b="1">
+                        <a:solidFill>
+                          <a:schemeClr val="lt1"/>
+                        </a:solidFill>
+                      </a:endParaRPr>
+                    </a:p>
+                    <a:p>
+                      <a:pPr indent="0" lvl="0" marL="0" rtl="0" algn="ctr">
+                        <a:spcBef>
+                          <a:spcPts val="0"/>
+                        </a:spcBef>
+                        <a:spcAft>
+                          <a:spcPts val="0"/>
+                        </a:spcAft>
+                        <a:buNone/>
+                      </a:pPr>
+                      <a:r>
+                        <a:rPr b="1" lang="en">
+                          <a:solidFill>
+                            <a:schemeClr val="lt1"/>
+                          </a:solidFill>
+                        </a:rPr>
+                        <a:t>roadmap</a:t>
+                      </a:r>
+                      <a:endParaRPr b="1">
                         <a:solidFill>
                           <a:schemeClr val="lt1"/>
                         </a:solidFill>
@@ -35510,7 +35550,7 @@
                     <a:bodyPr/>
                     <a:lstStyle/>
                     <a:p>
-                      <a:pPr indent="0" lvl="0" marL="0" rtl="0" algn="l">
+                      <a:pPr indent="0" lvl="0" marL="0" rtl="0" algn="ctr">
                         <a:spcBef>
                           <a:spcPts val="0"/>
                         </a:spcBef>
@@ -35520,14 +35560,29 @@
                         <a:buNone/>
                       </a:pPr>
                       <a:r>
-                        <a:rPr b="1" lang="en" sz="1800">
+                        <a:rPr b="1" lang="en">
                           <a:solidFill>
                             <a:schemeClr val="lt1"/>
                           </a:solidFill>
                         </a:rPr>
-                        <a:t>Product release</a:t>
+                        <a:t>Product or</a:t>
                       </a:r>
-                      <a:endParaRPr b="1" sz="1800">
+                      <a:br>
+                        <a:rPr b="1" lang="en">
+                          <a:solidFill>
+                            <a:schemeClr val="lt1"/>
+                          </a:solidFill>
+                        </a:rPr>
+                      </a:br>
+                      <a:r>
+                        <a:rPr b="1" lang="en">
+                          <a:solidFill>
+                            <a:schemeClr val="lt1"/>
+                          </a:solidFill>
+                        </a:rPr>
+                        <a:t>project release</a:t>
+                      </a:r>
+                      <a:endParaRPr b="1">
                         <a:solidFill>
                           <a:schemeClr val="lt1"/>
                         </a:solidFill>
@@ -37320,7 +37375,7 @@
             </a:pPr>
             <a:r>
               <a:rPr lang="en"/>
-              <a:t>Please define and agree on product vision and project mission</a:t>
+              <a:t>Please discuss and agree on product vision and project mission</a:t>
             </a:r>
             <a:endParaRPr/>
           </a:p>

</xml_diff>